<commit_message>
Update to README.MD file and presentation files
</commit_message>
<xml_diff>
--- a/PresentationPPT-SC.pptx
+++ b/PresentationPPT-SC.pptx
@@ -4115,7 +4115,7 @@
         </p:nvSpPr>
         <p:spPr>
           <a:xfrm>
-            <a:off x="3473450" y="2044700"/>
+            <a:off x="3600450" y="2302156"/>
             <a:ext cx="6057901" cy="1565959"/>
           </a:xfrm>
           <a:prstGeom prst="rect">
@@ -4385,8 +4385,8 @@
         </p:nvSpPr>
         <p:spPr>
           <a:xfrm>
-            <a:off x="1270000" y="927100"/>
-            <a:ext cx="10464800" cy="1130300"/>
+            <a:off x="1270000" y="310475"/>
+            <a:ext cx="10464800" cy="1130301"/>
           </a:xfrm>
           <a:prstGeom prst="rect">
             <a:avLst/>
@@ -4409,14 +4409,14 @@
       </p:sp>
       <p:sp>
         <p:nvSpPr>
-          <p:cNvPr id="150" name="[(2, 'ash'), (2, 'proanthocyanins'), (2, 'color_intensity'), (1, 'alcalinity_of_ash'), (1, 'od280/od315_of_diluted_wines'), (0, 'alcohol'), (0, 'malic_acid'), (0, 'magnesium'), (0, 'total_phenols'), (0, 'flavanoids'), (0, 'nonflavanoid_phenols'), (0, 'hue'), (0, 'proline')]"/>
+          <p:cNvPr id="150" name="[(2, ‘ash’),…"/>
           <p:cNvSpPr txBox="1"/>
           <p:nvPr/>
         </p:nvSpPr>
         <p:spPr>
           <a:xfrm>
-            <a:off x="188163" y="2568856"/>
-            <a:ext cx="12628474" cy="1565959"/>
+            <a:off x="2750616" y="1430307"/>
+            <a:ext cx="7503568" cy="5248960"/>
           </a:xfrm>
           <a:prstGeom prst="rect">
             <a:avLst/>
@@ -4431,14 +4431,86 @@
           </a:extLst>
         </p:spPr>
         <p:txBody>
-          <a:bodyPr wrap="none" lIns="50800" tIns="50800" rIns="50800" bIns="50800" anchor="ctr">
+          <a:bodyPr lIns="50800" tIns="50800" rIns="50800" bIns="50800" anchor="ctr">
             <a:spAutoFit/>
           </a:bodyPr>
           <a:lstStyle/>
           <a:p>
             <a:pPr/>
             <a:r>
-              <a:t>[(2, 'ash'), (2, 'proanthocyanins'), (2, 'color_intensity'), (1, 'alcalinity_of_ash'), (1, 'od280/od315_of_diluted_wines'), (0, 'alcohol'), (0, 'malic_acid'), (0, 'magnesium'), (0, 'total_phenols'), (0, 'flavanoids'), (0, 'nonflavanoid_phenols'), (0, 'hue'), (0, 'proline')]</a:t>
+              <a:t>[(2, ‘ash’),</a:t>
+            </a:r>
+          </a:p>
+          <a:p>
+            <a:pPr/>
+            <a:r>
+              <a:t>(2, ‘proanthocyanins'),</a:t>
+            </a:r>
+          </a:p>
+          <a:p>
+            <a:pPr/>
+            <a:r>
+              <a:t>(2, ‘color_intensity'),</a:t>
+            </a:r>
+          </a:p>
+          <a:p>
+            <a:pPr/>
+            <a:r>
+              <a:t> (1, 'alcalinity_of_ash'), </a:t>
+            </a:r>
+          </a:p>
+          <a:p>
+            <a:pPr/>
+            <a:r>
+              <a:t>(1, ‘od280/od315_of_diluted_wines’),</a:t>
+            </a:r>
+          </a:p>
+          <a:p>
+            <a:pPr/>
+            <a:r>
+              <a:t> (0, ‘alcohol'),</a:t>
+            </a:r>
+          </a:p>
+          <a:p>
+            <a:pPr/>
+            <a:r>
+              <a:t> (0, ‘malic_acid'),</a:t>
+            </a:r>
+          </a:p>
+          <a:p>
+            <a:pPr/>
+            <a:r>
+              <a:t> (0, ‘magnesium'),</a:t>
+            </a:r>
+          </a:p>
+          <a:p>
+            <a:pPr/>
+            <a:r>
+              <a:t> (0, ‘total_phenols'),</a:t>
+            </a:r>
+          </a:p>
+          <a:p>
+            <a:pPr/>
+            <a:r>
+              <a:t> (0, ‘flavanoids’),</a:t>
+            </a:r>
+          </a:p>
+          <a:p>
+            <a:pPr/>
+            <a:r>
+              <a:t> (0, ‘nonflavanoid_phenols'),</a:t>
+            </a:r>
+          </a:p>
+          <a:p>
+            <a:pPr/>
+            <a:r>
+              <a:t> (0, 'hue'), </a:t>
+            </a:r>
+          </a:p>
+          <a:p>
+            <a:pPr/>
+            <a:r>
+              <a:t>(0, 'proline')]</a:t>
             </a:r>
           </a:p>
         </p:txBody>
@@ -4451,8 +4523,8 @@
         </p:nvSpPr>
         <p:spPr>
           <a:xfrm>
-            <a:off x="1429613" y="4646270"/>
-            <a:ext cx="10145574" cy="461060"/>
+            <a:off x="1589936" y="6570768"/>
+            <a:ext cx="10145573" cy="461060"/>
           </a:xfrm>
           <a:prstGeom prst="rect">
             <a:avLst/>
@@ -4491,7 +4563,7 @@
         </p:nvSpPr>
         <p:spPr>
           <a:xfrm>
-            <a:off x="4495596" y="5344770"/>
+            <a:off x="4495596" y="7194644"/>
             <a:ext cx="4013608" cy="1934260"/>
           </a:xfrm>
           <a:prstGeom prst="rect">

</xml_diff>